<commit_message>
update slides & modbus
</commit_message>
<xml_diff>
--- a/presentation.pptx
+++ b/presentation.pptx
@@ -3955,6 +3955,54 @@
           </a:p>
         </p:txBody>
       </p:sp>
+      <p:sp>
+        <p:nvSpPr>
+          <p:cNvPr id="3" name="文字方塊 2">
+            <a:extLst>
+              <a:ext uri="{FF2B5EF4-FFF2-40B4-BE49-F238E27FC236}">
+                <a16:creationId xmlns:a16="http://schemas.microsoft.com/office/drawing/2014/main" id="{D7ED8970-8F05-4B22-B2F5-CFE549DF4EF9}"/>
+              </a:ext>
+            </a:extLst>
+          </p:cNvPr>
+          <p:cNvSpPr txBox="1"/>
+          <p:nvPr/>
+        </p:nvSpPr>
+        <p:spPr>
+          <a:xfrm>
+            <a:off x="584956" y="3129941"/>
+            <a:ext cx="5613504" cy="369332"/>
+          </a:xfrm>
+          <a:prstGeom prst="rect">
+            <a:avLst/>
+          </a:prstGeom>
+          <a:noFill/>
+        </p:spPr>
+        <p:txBody>
+          <a:bodyPr wrap="square" rtlCol="0">
+            <a:spAutoFit/>
+          </a:bodyPr>
+          <a:lstStyle/>
+          <a:p>
+            <a:r>
+              <a:rPr lang="zh-TW" altLang="en-US" dirty="0">
+                <a:solidFill>
+                  <a:schemeClr val="bg1"/>
+                </a:solidFill>
+                <a:latin typeface="Noto Sans CJK TC Regular" panose="020B0500000000000000" pitchFamily="34" charset="-128"/>
+                <a:ea typeface="Noto Sans CJK TC Regular" panose="020B0500000000000000" pitchFamily="34" charset="-128"/>
+              </a:rPr>
+              <a:t>基礎設施安全 第六組</a:t>
+            </a:r>
+            <a:endParaRPr lang="en-US" altLang="zh-TW" dirty="0">
+              <a:solidFill>
+                <a:schemeClr val="bg1"/>
+              </a:solidFill>
+              <a:latin typeface="Noto Sans CJK TC Regular" panose="020B0500000000000000" pitchFamily="34" charset="-128"/>
+              <a:ea typeface="Noto Sans CJK TC Regular" panose="020B0500000000000000" pitchFamily="34" charset="-128"/>
+            </a:endParaRPr>
+          </a:p>
+        </p:txBody>
+      </p:sp>
     </p:spTree>
     <p:extLst>
       <p:ext uri="{BB962C8B-B14F-4D97-AF65-F5344CB8AC3E}">

</xml_diff>